<commit_message>
Updated Power Point pdf
</commit_message>
<xml_diff>
--- a/Analytics_Output/unemployment_house.pptx
+++ b/Analytics_Output/unemployment_house.pptx
@@ -715,7 +715,7 @@
           <a:p>
             <a:fld id="{665BF680-B878-406A-967D-99BF7C4F1E5A}" type="datetimeFigureOut">
               <a:rPr lang="en-US" smtClean="0"/>
-              <a:t>12/2/2024</a:t>
+              <a:t>12/3/2024</a:t>
             </a:fld>
             <a:endParaRPr lang="en-US"/>
           </a:p>
@@ -885,7 +885,7 @@
           <a:p>
             <a:fld id="{665BF680-B878-406A-967D-99BF7C4F1E5A}" type="datetimeFigureOut">
               <a:rPr lang="en-US" smtClean="0"/>
-              <a:t>12/2/2024</a:t>
+              <a:t>12/3/2024</a:t>
             </a:fld>
             <a:endParaRPr lang="en-US"/>
           </a:p>
@@ -1065,7 +1065,7 @@
           <a:p>
             <a:fld id="{665BF680-B878-406A-967D-99BF7C4F1E5A}" type="datetimeFigureOut">
               <a:rPr lang="en-US" smtClean="0"/>
-              <a:t>12/2/2024</a:t>
+              <a:t>12/3/2024</a:t>
             </a:fld>
             <a:endParaRPr lang="en-US"/>
           </a:p>
@@ -1235,7 +1235,7 @@
           <a:p>
             <a:fld id="{665BF680-B878-406A-967D-99BF7C4F1E5A}" type="datetimeFigureOut">
               <a:rPr lang="en-US" smtClean="0"/>
-              <a:t>12/2/2024</a:t>
+              <a:t>12/3/2024</a:t>
             </a:fld>
             <a:endParaRPr lang="en-US"/>
           </a:p>
@@ -1503,7 +1503,7 @@
           <a:p>
             <a:fld id="{665BF680-B878-406A-967D-99BF7C4F1E5A}" type="datetimeFigureOut">
               <a:rPr lang="en-US" smtClean="0"/>
-              <a:t>12/2/2024</a:t>
+              <a:t>12/3/2024</a:t>
             </a:fld>
             <a:endParaRPr lang="en-US"/>
           </a:p>
@@ -1735,7 +1735,7 @@
           <a:p>
             <a:fld id="{665BF680-B878-406A-967D-99BF7C4F1E5A}" type="datetimeFigureOut">
               <a:rPr lang="en-US" smtClean="0"/>
-              <a:t>12/2/2024</a:t>
+              <a:t>12/3/2024</a:t>
             </a:fld>
             <a:endParaRPr lang="en-US"/>
           </a:p>
@@ -2094,7 +2094,7 @@
           <a:p>
             <a:fld id="{665BF680-B878-406A-967D-99BF7C4F1E5A}" type="datetimeFigureOut">
               <a:rPr lang="en-US" smtClean="0"/>
-              <a:t>12/2/2024</a:t>
+              <a:t>12/3/2024</a:t>
             </a:fld>
             <a:endParaRPr lang="en-US"/>
           </a:p>
@@ -2235,7 +2235,7 @@
           <a:p>
             <a:fld id="{665BF680-B878-406A-967D-99BF7C4F1E5A}" type="datetimeFigureOut">
               <a:rPr lang="en-US" smtClean="0"/>
-              <a:t>12/2/2024</a:t>
+              <a:t>12/3/2024</a:t>
             </a:fld>
             <a:endParaRPr lang="en-US"/>
           </a:p>
@@ -2330,7 +2330,7 @@
           <a:p>
             <a:fld id="{665BF680-B878-406A-967D-99BF7C4F1E5A}" type="datetimeFigureOut">
               <a:rPr lang="en-US" smtClean="0"/>
-              <a:t>12/2/2024</a:t>
+              <a:t>12/3/2024</a:t>
             </a:fld>
             <a:endParaRPr lang="en-US"/>
           </a:p>
@@ -2687,7 +2687,7 @@
           <a:p>
             <a:fld id="{665BF680-B878-406A-967D-99BF7C4F1E5A}" type="datetimeFigureOut">
               <a:rPr lang="en-US" smtClean="0"/>
-              <a:t>12/2/2024</a:t>
+              <a:t>12/3/2024</a:t>
             </a:fld>
             <a:endParaRPr lang="en-US"/>
           </a:p>
@@ -3044,7 +3044,7 @@
           <a:p>
             <a:fld id="{665BF680-B878-406A-967D-99BF7C4F1E5A}" type="datetimeFigureOut">
               <a:rPr lang="en-US" smtClean="0"/>
-              <a:t>12/2/2024</a:t>
+              <a:t>12/3/2024</a:t>
             </a:fld>
             <a:endParaRPr lang="en-US"/>
           </a:p>
@@ -3286,7 +3286,7 @@
           <a:p>
             <a:fld id="{665BF680-B878-406A-967D-99BF7C4F1E5A}" type="datetimeFigureOut">
               <a:rPr lang="en-US" smtClean="0"/>
-              <a:t>12/2/2024</a:t>
+              <a:t>12/3/2024</a:t>
             </a:fld>
             <a:endParaRPr lang="en-US"/>
           </a:p>

</xml_diff>